<commit_message>
update documentation and organize files
</commit_message>
<xml_diff>
--- a/LaTeX_documentation/WorkFlowSchematic.pptx
+++ b/LaTeX_documentation/WorkFlowSchematic.pptx
@@ -254,7 +254,7 @@
           <a:p>
             <a:fld id="{D02FEDC3-3BB2-49A6-BF32-B87A34325CFE}" type="datetimeFigureOut">
               <a:rPr lang="en-US" smtClean="0"/>
-              <a:t>12/17/2018</a:t>
+              <a:t>12/18/2018</a:t>
             </a:fld>
             <a:endParaRPr lang="en-US"/>
           </a:p>
@@ -424,7 +424,7 @@
           <a:p>
             <a:fld id="{D02FEDC3-3BB2-49A6-BF32-B87A34325CFE}" type="datetimeFigureOut">
               <a:rPr lang="en-US" smtClean="0"/>
-              <a:t>12/17/2018</a:t>
+              <a:t>12/18/2018</a:t>
             </a:fld>
             <a:endParaRPr lang="en-US"/>
           </a:p>
@@ -604,7 +604,7 @@
           <a:p>
             <a:fld id="{D02FEDC3-3BB2-49A6-BF32-B87A34325CFE}" type="datetimeFigureOut">
               <a:rPr lang="en-US" smtClean="0"/>
-              <a:t>12/17/2018</a:t>
+              <a:t>12/18/2018</a:t>
             </a:fld>
             <a:endParaRPr lang="en-US"/>
           </a:p>
@@ -774,7 +774,7 @@
           <a:p>
             <a:fld id="{D02FEDC3-3BB2-49A6-BF32-B87A34325CFE}" type="datetimeFigureOut">
               <a:rPr lang="en-US" smtClean="0"/>
-              <a:t>12/17/2018</a:t>
+              <a:t>12/18/2018</a:t>
             </a:fld>
             <a:endParaRPr lang="en-US"/>
           </a:p>
@@ -1020,7 +1020,7 @@
           <a:p>
             <a:fld id="{D02FEDC3-3BB2-49A6-BF32-B87A34325CFE}" type="datetimeFigureOut">
               <a:rPr lang="en-US" smtClean="0"/>
-              <a:t>12/17/2018</a:t>
+              <a:t>12/18/2018</a:t>
             </a:fld>
             <a:endParaRPr lang="en-US"/>
           </a:p>
@@ -1252,7 +1252,7 @@
           <a:p>
             <a:fld id="{D02FEDC3-3BB2-49A6-BF32-B87A34325CFE}" type="datetimeFigureOut">
               <a:rPr lang="en-US" smtClean="0"/>
-              <a:t>12/17/2018</a:t>
+              <a:t>12/18/2018</a:t>
             </a:fld>
             <a:endParaRPr lang="en-US"/>
           </a:p>
@@ -1619,7 +1619,7 @@
           <a:p>
             <a:fld id="{D02FEDC3-3BB2-49A6-BF32-B87A34325CFE}" type="datetimeFigureOut">
               <a:rPr lang="en-US" smtClean="0"/>
-              <a:t>12/17/2018</a:t>
+              <a:t>12/18/2018</a:t>
             </a:fld>
             <a:endParaRPr lang="en-US"/>
           </a:p>
@@ -1737,7 +1737,7 @@
           <a:p>
             <a:fld id="{D02FEDC3-3BB2-49A6-BF32-B87A34325CFE}" type="datetimeFigureOut">
               <a:rPr lang="en-US" smtClean="0"/>
-              <a:t>12/17/2018</a:t>
+              <a:t>12/18/2018</a:t>
             </a:fld>
             <a:endParaRPr lang="en-US"/>
           </a:p>
@@ -1832,7 +1832,7 @@
           <a:p>
             <a:fld id="{D02FEDC3-3BB2-49A6-BF32-B87A34325CFE}" type="datetimeFigureOut">
               <a:rPr lang="en-US" smtClean="0"/>
-              <a:t>12/17/2018</a:t>
+              <a:t>12/18/2018</a:t>
             </a:fld>
             <a:endParaRPr lang="en-US"/>
           </a:p>
@@ -2109,7 +2109,7 @@
           <a:p>
             <a:fld id="{D02FEDC3-3BB2-49A6-BF32-B87A34325CFE}" type="datetimeFigureOut">
               <a:rPr lang="en-US" smtClean="0"/>
-              <a:t>12/17/2018</a:t>
+              <a:t>12/18/2018</a:t>
             </a:fld>
             <a:endParaRPr lang="en-US"/>
           </a:p>
@@ -2366,7 +2366,7 @@
           <a:p>
             <a:fld id="{D02FEDC3-3BB2-49A6-BF32-B87A34325CFE}" type="datetimeFigureOut">
               <a:rPr lang="en-US" smtClean="0"/>
-              <a:t>12/17/2018</a:t>
+              <a:t>12/18/2018</a:t>
             </a:fld>
             <a:endParaRPr lang="en-US"/>
           </a:p>
@@ -2579,7 +2579,7 @@
           <a:p>
             <a:fld id="{D02FEDC3-3BB2-49A6-BF32-B87A34325CFE}" type="datetimeFigureOut">
               <a:rPr lang="en-US" smtClean="0"/>
-              <a:t>12/17/2018</a:t>
+              <a:t>12/18/2018</a:t>
             </a:fld>
             <a:endParaRPr lang="en-US"/>
           </a:p>
@@ -3136,7 +3136,10 @@
           <a:lstStyle/>
           <a:p>
             <a:pPr algn="ctr"/>
-            <a:endParaRPr lang="en-US"/>
+            <a:r>
+              <a:rPr lang="en-US" dirty="0"/>
+              <a:t> </a:t>
+            </a:r>
           </a:p>
         </p:txBody>
       </p:sp>
@@ -3259,7 +3262,7 @@
         <p:spPr>
           <a:xfrm>
             <a:off x="2755687" y="1931418"/>
-            <a:ext cx="3548294" cy="677108"/>
+            <a:ext cx="3548294" cy="1785104"/>
           </a:xfrm>
           <a:prstGeom prst="rect">
             <a:avLst/>
@@ -3278,11 +3281,9 @@
           <a:lstStyle/>
           <a:p>
             <a:r>
-              <a:rPr lang="en-US" sz="1100" b="1" dirty="0"/>
+              <a:rPr lang="en-US" sz="1400" b="1" dirty="0"/>
               <a:t>Gather and merge PM2.5 data</a:t>
             </a:r>
-          </a:p>
-          <a:p>
             <a:endParaRPr lang="en-US" sz="900" dirty="0"/>
           </a:p>
           <a:p>
@@ -3291,7 +3292,7 @@
               <a:buAutoNum type="arabicPeriod"/>
             </a:pPr>
             <a:r>
-              <a:rPr lang="en-US" sz="900" dirty="0"/>
+              <a:rPr lang="en-US" sz="1200" dirty="0"/>
               <a:t>Process_PM25_data_step1.R</a:t>
             </a:r>
           </a:p>
@@ -3301,12 +3302,96 @@
               <a:buAutoNum type="arabicPeriod"/>
             </a:pPr>
             <a:r>
-              <a:rPr lang="en-US" sz="900" dirty="0">
+              <a:rPr lang="en-US" sz="1200" dirty="0"/>
+              <a:t>Process_PM25_data_step2.R </a:t>
+            </a:r>
+            <a:r>
+              <a:rPr lang="en-US" sz="1200" dirty="0">
                 <a:solidFill>
                   <a:srgbClr val="FF0000"/>
                 </a:solidFill>
               </a:rPr>
-              <a:t>Process_PM25_data_step2.$</a:t>
+              <a:t>*</a:t>
+            </a:r>
+            <a:r>
+              <a:rPr lang="en-US" sz="1200" dirty="0" err="1">
+                <a:solidFill>
+                  <a:srgbClr val="FF0000"/>
+                </a:solidFill>
+              </a:rPr>
+              <a:t>ToDo</a:t>
+            </a:r>
+            <a:r>
+              <a:rPr lang="en-US" sz="1200" dirty="0">
+                <a:solidFill>
+                  <a:srgbClr val="FF0000"/>
+                </a:solidFill>
+              </a:rPr>
+              <a:t> – handful of quality cuts to add/decide about</a:t>
+            </a:r>
+          </a:p>
+          <a:p>
+            <a:pPr marL="228600" indent="-228600">
+              <a:buFont typeface="+mj-lt"/>
+              <a:buAutoNum type="arabicPeriod"/>
+            </a:pPr>
+            <a:r>
+              <a:rPr lang="en-US" sz="1200" dirty="0"/>
+              <a:t>Process_PM25_data_step3.R</a:t>
+            </a:r>
+          </a:p>
+          <a:p>
+            <a:pPr marL="228600" indent="-228600">
+              <a:buFont typeface="+mj-lt"/>
+              <a:buAutoNum type="arabicPeriod"/>
+            </a:pPr>
+            <a:r>
+              <a:rPr lang="en-US" sz="1200" dirty="0"/>
+              <a:t>Process_PM25_data_step4.R</a:t>
+            </a:r>
+          </a:p>
+          <a:p>
+            <a:pPr marL="228600" indent="-228600">
+              <a:buFont typeface="+mj-lt"/>
+              <a:buAutoNum type="arabicPeriod"/>
+            </a:pPr>
+            <a:r>
+              <a:rPr lang="en-US" sz="1200" dirty="0"/>
+              <a:t>Process_PM25_data_step5.R </a:t>
+            </a:r>
+            <a:r>
+              <a:rPr lang="en-US" sz="1200" dirty="0">
+                <a:solidFill>
+                  <a:srgbClr val="FF0000"/>
+                </a:solidFill>
+              </a:rPr>
+              <a:t>* </a:t>
+            </a:r>
+            <a:r>
+              <a:rPr lang="en-US" sz="1200" dirty="0" err="1">
+                <a:solidFill>
+                  <a:srgbClr val="FF0000"/>
+                </a:solidFill>
+              </a:rPr>
+              <a:t>ToDo</a:t>
+            </a:r>
+            <a:r>
+              <a:rPr lang="en-US" sz="1200" dirty="0">
+                <a:solidFill>
+                  <a:srgbClr val="FF0000"/>
+                </a:solidFill>
+              </a:rPr>
+              <a:t> – create co-located version of data</a:t>
+            </a:r>
+          </a:p>
+          <a:p>
+            <a:pPr marL="228600" indent="-228600">
+              <a:buFont typeface="+mj-lt"/>
+              <a:buAutoNum type="arabicPeriod"/>
+            </a:pPr>
+            <a:r>
+              <a:rPr lang="en-US" sz="1200" dirty="0"/>
+              <a:t>Process_PM25_data_step6.R (optional)</a:t>
             </a:r>
           </a:p>
         </p:txBody>
@@ -3326,7 +3411,7 @@
         <p:spPr>
           <a:xfrm>
             <a:off x="22264212" y="2038773"/>
-            <a:ext cx="3072493" cy="538609"/>
+            <a:ext cx="3704748" cy="677108"/>
           </a:xfrm>
           <a:prstGeom prst="rect">
             <a:avLst/>
@@ -3345,12 +3430,16 @@
           <a:lstStyle/>
           <a:p>
             <a:r>
-              <a:rPr lang="en-US" sz="1100" b="1" dirty="0"/>
+              <a:rPr lang="en-US" sz="1400" b="1" dirty="0"/>
               <a:t>Identify county centroids</a:t>
             </a:r>
             <a:r>
-              <a:rPr lang="en-US" sz="900" dirty="0"/>
-              <a:t> (locations of interest)</a:t>
+              <a:rPr lang="en-US" sz="1400" dirty="0"/>
+              <a:t> </a:t>
+            </a:r>
+            <a:r>
+              <a:rPr lang="en-US" sz="1200" dirty="0"/>
+              <a:t>(locations of interest)</a:t>
             </a:r>
           </a:p>
           <a:p>
@@ -3359,10 +3448,10 @@
               <a:buAutoNum type="arabicPeriod"/>
             </a:pPr>
             <a:r>
-              <a:rPr lang="en-US" sz="900" dirty="0" err="1"/>
+              <a:rPr lang="en-US" sz="1200" dirty="0" err="1"/>
               <a:t>CountyCentroid_CreateLatLonDateFiles.R</a:t>
             </a:r>
-            <a:endParaRPr lang="en-US" sz="900" dirty="0"/>
+            <a:endParaRPr lang="en-US" sz="1200" dirty="0"/>
           </a:p>
           <a:p>
             <a:pPr marL="171450" indent="-171450">
@@ -3370,11 +3459,11 @@
               <a:buAutoNum type="arabicPeriod"/>
             </a:pPr>
             <a:r>
-              <a:rPr lang="en-US" sz="900" dirty="0" err="1"/>
+              <a:rPr lang="en-US" sz="1200" dirty="0" err="1"/>
               <a:t>CountyCentroid_PlotLocations.R</a:t>
             </a:r>
             <a:r>
-              <a:rPr lang="en-US" sz="900" dirty="0"/>
+              <a:rPr lang="en-US" sz="1200" dirty="0"/>
               <a:t> (optional)</a:t>
             </a:r>
           </a:p>
@@ -3395,7 +3484,7 @@
         <p:spPr>
           <a:xfrm>
             <a:off x="15239177" y="1956809"/>
-            <a:ext cx="2237015" cy="538609"/>
+            <a:ext cx="2839274" cy="584775"/>
           </a:xfrm>
           <a:prstGeom prst="rect">
             <a:avLst/>
@@ -3414,7 +3503,7 @@
           <a:lstStyle/>
           <a:p>
             <a:r>
-              <a:rPr lang="en-US" sz="1100" b="1" dirty="0"/>
+              <a:rPr lang="en-US" sz="1400" b="1" dirty="0"/>
               <a:t>Download and Process MAIAC data</a:t>
             </a:r>
           </a:p>
@@ -3441,7 +3530,7 @@
         <p:spPr>
           <a:xfrm>
             <a:off x="11914932" y="4658088"/>
-            <a:ext cx="2669722" cy="538609"/>
+            <a:ext cx="3931082" cy="584775"/>
           </a:xfrm>
           <a:prstGeom prst="rect">
             <a:avLst/>
@@ -3460,7 +3549,7 @@
           <a:lstStyle/>
           <a:p>
             <a:r>
-              <a:rPr lang="en-US" sz="1100" b="1" dirty="0"/>
+              <a:rPr lang="en-US" sz="1400" b="1" dirty="0"/>
               <a:t>Extract predictors to observation locations</a:t>
             </a:r>
           </a:p>
@@ -3487,7 +3576,7 @@
         <p:spPr>
           <a:xfrm>
             <a:off x="18296196" y="4658087"/>
-            <a:ext cx="2669722" cy="538609"/>
+            <a:ext cx="4187286" cy="584775"/>
           </a:xfrm>
           <a:prstGeom prst="rect">
             <a:avLst/>
@@ -3506,7 +3595,7 @@
           <a:lstStyle/>
           <a:p>
             <a:r>
-              <a:rPr lang="en-US" sz="1100" b="1" dirty="0"/>
+              <a:rPr lang="en-US" sz="1400" b="1" dirty="0"/>
               <a:t>Extract predictors to locations of interest</a:t>
             </a:r>
           </a:p>
@@ -3638,7 +3727,7 @@
         <p:spPr>
           <a:xfrm>
             <a:off x="18078451" y="7419021"/>
-            <a:ext cx="3993610" cy="815608"/>
+            <a:ext cx="5190340" cy="1000274"/>
           </a:xfrm>
           <a:prstGeom prst="rect">
             <a:avLst/>
@@ -3657,7 +3746,7 @@
           <a:lstStyle/>
           <a:p>
             <a:r>
-              <a:rPr lang="en-US" sz="1100" b="1" dirty="0"/>
+              <a:rPr lang="en-US" sz="1400" b="1" dirty="0"/>
               <a:t>Merge predictors to locations of interest</a:t>
             </a:r>
           </a:p>
@@ -3667,10 +3756,10 @@
               <a:buAutoNum type="arabicPeriod"/>
             </a:pPr>
             <a:r>
-              <a:rPr lang="en-US" sz="900" dirty="0" err="1"/>
+              <a:rPr lang="en-US" sz="1200" dirty="0" err="1"/>
               <a:t>Merge_predictors_to_points_of_interest.R</a:t>
             </a:r>
-            <a:endParaRPr lang="en-US" sz="900" dirty="0"/>
+            <a:endParaRPr lang="en-US" sz="1200" dirty="0"/>
           </a:p>
           <a:p>
             <a:pPr marL="400050" lvl="1" indent="-171450">
@@ -3678,7 +3767,7 @@
               <a:buAutoNum type="arabicPeriod"/>
             </a:pPr>
             <a:r>
-              <a:rPr lang="en-US" sz="900" dirty="0"/>
+              <a:rPr lang="en-US" sz="1200" dirty="0"/>
               <a:t>Merge_predictors_to_points_of_interest_parallel_wrapper_function.R</a:t>
             </a:r>
           </a:p>
@@ -3688,11 +3777,11 @@
               <a:buAutoNum type="arabicPeriod"/>
             </a:pPr>
             <a:r>
-              <a:rPr lang="en-US" sz="900" dirty="0" err="1"/>
+              <a:rPr lang="en-US" sz="1200" dirty="0" err="1"/>
               <a:t>Plot_Predictor_Inputs.R</a:t>
             </a:r>
             <a:r>
-              <a:rPr lang="en-US" sz="900" dirty="0"/>
+              <a:rPr lang="en-US" sz="1200" dirty="0"/>
               <a:t> (optional)</a:t>
             </a:r>
           </a:p>
@@ -3715,8 +3804,8 @@
         </p:nvSpPr>
         <p:spPr>
           <a:xfrm>
-            <a:off x="26555723" y="1954135"/>
-            <a:ext cx="3072493" cy="707886"/>
+            <a:off x="26555722" y="1954135"/>
+            <a:ext cx="5155531" cy="677108"/>
           </a:xfrm>
           <a:prstGeom prst="rect">
             <a:avLst/>
@@ -3735,24 +3824,20 @@
           <a:lstStyle/>
           <a:p>
             <a:r>
-              <a:rPr lang="en-US" sz="1100" b="1" dirty="0"/>
+              <a:rPr lang="en-US" sz="1400" b="1" dirty="0"/>
               <a:t>Identify population-weighted county centroids </a:t>
             </a:r>
             <a:r>
-              <a:rPr lang="en-US" sz="1100" dirty="0"/>
+              <a:rPr lang="en-US" sz="1200" dirty="0"/>
               <a:t>(locations of </a:t>
             </a:r>
             <a:r>
-              <a:rPr lang="en-US" sz="1100" dirty="0" err="1"/>
+              <a:rPr lang="en-US" sz="1200" dirty="0" err="1"/>
               <a:t>interst</a:t>
             </a:r>
             <a:r>
-              <a:rPr lang="en-US" sz="1100" dirty="0"/>
-              <a:t>)</a:t>
-            </a:r>
-            <a:r>
-              <a:rPr lang="en-US" sz="900" dirty="0"/>
-              <a:t> </a:t>
+              <a:rPr lang="en-US" sz="1200" dirty="0"/>
+              <a:t>) </a:t>
             </a:r>
           </a:p>
           <a:p>
@@ -3761,15 +3846,15 @@
               <a:buAutoNum type="arabicPeriod"/>
             </a:pPr>
             <a:r>
-              <a:rPr lang="en-US" sz="900" dirty="0" err="1"/>
+              <a:rPr lang="en-US" sz="1200" dirty="0" err="1"/>
               <a:t>Extract_county_pop_centroids.R</a:t>
             </a:r>
             <a:r>
-              <a:rPr lang="en-US" sz="900" dirty="0"/>
+              <a:rPr lang="en-US" sz="1200" dirty="0"/>
               <a:t> </a:t>
             </a:r>
             <a:r>
-              <a:rPr lang="en-US" sz="900" b="1" dirty="0">
+              <a:rPr lang="en-US" sz="1200" b="1" dirty="0">
                 <a:solidFill>
                   <a:srgbClr val="FF0000"/>
                 </a:solidFill>
@@ -3931,6 +4016,66 @@
             <a:r>
               <a:rPr lang="en-US" sz="3000" dirty="0"/>
               <a:t>5</a:t>
+            </a:r>
+          </a:p>
+        </p:txBody>
+      </p:sp>
+      <p:sp>
+        <p:nvSpPr>
+          <p:cNvPr id="25" name="TextBox 24">
+            <a:extLst>
+              <a:ext uri="{FF2B5EF4-FFF2-40B4-BE49-F238E27FC236}">
+                <a16:creationId xmlns:a16="http://schemas.microsoft.com/office/drawing/2014/main" id="{1BF131E8-2E53-4E07-80AE-91E51B370933}"/>
+              </a:ext>
+            </a:extLst>
+          </p:cNvPr>
+          <p:cNvSpPr txBox="1"/>
+          <p:nvPr/>
+        </p:nvSpPr>
+        <p:spPr>
+          <a:xfrm>
+            <a:off x="10754286" y="7419021"/>
+            <a:ext cx="3993610" cy="677108"/>
+          </a:xfrm>
+          <a:prstGeom prst="rect">
+            <a:avLst/>
+          </a:prstGeom>
+          <a:noFill/>
+          <a:ln>
+            <a:solidFill>
+              <a:schemeClr val="tx1"/>
+            </a:solidFill>
+          </a:ln>
+        </p:spPr>
+        <p:txBody>
+          <a:bodyPr wrap="square" rtlCol="0">
+            <a:spAutoFit/>
+          </a:bodyPr>
+          <a:lstStyle/>
+          <a:p>
+            <a:r>
+              <a:rPr lang="en-US" sz="1400" b="1" dirty="0"/>
+              <a:t>Merge predictors to PM2.5 observations</a:t>
+            </a:r>
+          </a:p>
+          <a:p>
+            <a:pPr marL="228600" indent="-228600">
+              <a:buFont typeface="+mj-lt"/>
+              <a:buAutoNum type="arabicPeriod"/>
+            </a:pPr>
+            <a:r>
+              <a:rPr lang="en-US" sz="1200" dirty="0"/>
+              <a:t>ML_PM25_estimation_merge_predictors.R</a:t>
+            </a:r>
+          </a:p>
+          <a:p>
+            <a:pPr marL="228600" indent="-228600">
+              <a:buFont typeface="+mj-lt"/>
+              <a:buAutoNum type="arabicPeriod"/>
+            </a:pPr>
+            <a:r>
+              <a:rPr lang="en-US" sz="1200" dirty="0"/>
+              <a:t>ML_PM25_estimation_plot_predictors (optional)</a:t>
             </a:r>
           </a:p>
         </p:txBody>

</xml_diff>